<commit_message>
Adding notes for final deliverables.
</commit_message>
<xml_diff>
--- a/doc/talk/IKSwift.pptx
+++ b/doc/talk/IKSwift.pptx
@@ -5,14 +5,15 @@
     <p:sldMasterId id="2147484063" r:id="rId1"/>
   </p:sldMasterIdLst>
   <p:notesMasterIdLst>
-    <p:notesMasterId r:id="rId4"/>
+    <p:notesMasterId r:id="rId5"/>
   </p:notesMasterIdLst>
   <p:handoutMasterIdLst>
-    <p:handoutMasterId r:id="rId5"/>
+    <p:handoutMasterId r:id="rId6"/>
   </p:handoutMasterIdLst>
   <p:sldIdLst>
-    <p:sldId id="362" r:id="rId2"/>
-    <p:sldId id="366" r:id="rId3"/>
+    <p:sldId id="367" r:id="rId2"/>
+    <p:sldId id="362" r:id="rId3"/>
+    <p:sldId id="366" r:id="rId4"/>
   </p:sldIdLst>
   <p:sldSz cx="9144000" cy="6858000" type="screen4x3"/>
   <p:notesSz cx="6858000" cy="9296400"/>
@@ -290,7 +291,7 @@
               <a:pPr>
                 <a:defRPr/>
               </a:pPr>
-              <a:t>5/2/14</a:t>
+              <a:t>5/8/14</a:t>
             </a:fld>
             <a:endParaRPr lang="en-US"/>
           </a:p>
@@ -1124,7 +1125,7 @@
           <a:p>
             <a:fld id="{374D2CB4-9CEF-3C4C-842D-04B843513857}" type="datetimeFigureOut">
               <a:rPr lang="en-US" smtClean="0"/>
-              <a:t>5/2/14</a:t>
+              <a:t>5/8/14</a:t>
             </a:fld>
             <a:endParaRPr lang="en-US"/>
           </a:p>
@@ -1294,7 +1295,7 @@
           <a:p>
             <a:fld id="{374D2CB4-9CEF-3C4C-842D-04B843513857}" type="datetimeFigureOut">
               <a:rPr lang="en-US" smtClean="0"/>
-              <a:t>5/2/14</a:t>
+              <a:t>5/8/14</a:t>
             </a:fld>
             <a:endParaRPr lang="en-US"/>
           </a:p>
@@ -1504,7 +1505,7 @@
           <a:p>
             <a:fld id="{374D2CB4-9CEF-3C4C-842D-04B843513857}" type="datetimeFigureOut">
               <a:rPr lang="en-US" smtClean="0"/>
-              <a:t>5/2/14</a:t>
+              <a:t>5/8/14</a:t>
             </a:fld>
             <a:endParaRPr lang="en-US"/>
           </a:p>
@@ -1674,7 +1675,7 @@
           <a:p>
             <a:fld id="{374D2CB4-9CEF-3C4C-842D-04B843513857}" type="datetimeFigureOut">
               <a:rPr lang="en-US" smtClean="0"/>
-              <a:t>5/2/14</a:t>
+              <a:t>5/8/14</a:t>
             </a:fld>
             <a:endParaRPr lang="en-US"/>
           </a:p>
@@ -1950,7 +1951,7 @@
           <a:p>
             <a:fld id="{374D2CB4-9CEF-3C4C-842D-04B843513857}" type="datetimeFigureOut">
               <a:rPr lang="en-US" smtClean="0"/>
-              <a:t>5/2/14</a:t>
+              <a:t>5/8/14</a:t>
             </a:fld>
             <a:endParaRPr lang="en-US"/>
           </a:p>
@@ -2238,7 +2239,7 @@
           <a:p>
             <a:fld id="{374D2CB4-9CEF-3C4C-842D-04B843513857}" type="datetimeFigureOut">
               <a:rPr lang="en-US" smtClean="0"/>
-              <a:t>5/2/14</a:t>
+              <a:t>5/8/14</a:t>
             </a:fld>
             <a:endParaRPr lang="en-US"/>
           </a:p>
@@ -2690,7 +2691,7 @@
           <a:p>
             <a:fld id="{374D2CB4-9CEF-3C4C-842D-04B843513857}" type="datetimeFigureOut">
               <a:rPr lang="en-US" smtClean="0"/>
-              <a:t>5/2/14</a:t>
+              <a:t>5/8/14</a:t>
             </a:fld>
             <a:endParaRPr lang="en-US"/>
           </a:p>
@@ -2838,7 +2839,7 @@
           <a:p>
             <a:fld id="{374D2CB4-9CEF-3C4C-842D-04B843513857}" type="datetimeFigureOut">
               <a:rPr lang="en-US" smtClean="0"/>
-              <a:t>5/2/14</a:t>
+              <a:t>5/8/14</a:t>
             </a:fld>
             <a:endParaRPr lang="en-US"/>
           </a:p>
@@ -2933,7 +2934,7 @@
           <a:p>
             <a:fld id="{374D2CB4-9CEF-3C4C-842D-04B843513857}" type="datetimeFigureOut">
               <a:rPr lang="en-US" smtClean="0"/>
-              <a:t>5/2/14</a:t>
+              <a:t>5/8/14</a:t>
             </a:fld>
             <a:endParaRPr lang="en-US"/>
           </a:p>
@@ -3210,7 +3211,7 @@
           <a:p>
             <a:fld id="{374D2CB4-9CEF-3C4C-842D-04B843513857}" type="datetimeFigureOut">
               <a:rPr lang="en-US" smtClean="0"/>
-              <a:t>5/2/14</a:t>
+              <a:t>5/8/14</a:t>
             </a:fld>
             <a:endParaRPr lang="en-US"/>
           </a:p>
@@ -3463,7 +3464,7 @@
           <a:p>
             <a:fld id="{374D2CB4-9CEF-3C4C-842D-04B843513857}" type="datetimeFigureOut">
               <a:rPr lang="en-US" smtClean="0"/>
-              <a:t>5/2/14</a:t>
+              <a:t>5/8/14</a:t>
             </a:fld>
             <a:endParaRPr lang="en-US"/>
           </a:p>
@@ -3676,7 +3677,7 @@
           <a:p>
             <a:fld id="{374D2CB4-9CEF-3C4C-842D-04B843513857}" type="datetimeFigureOut">
               <a:rPr lang="en-US" smtClean="0"/>
-              <a:t>5/2/14</a:t>
+              <a:t>5/8/14</a:t>
             </a:fld>
             <a:endParaRPr lang="en-US"/>
           </a:p>
@@ -4144,6 +4145,161 @@
           <a:lstStyle/>
           <a:p>
             <a:r>
+              <a:rPr lang="en-US" dirty="0" smtClean="0"/>
+              <a:t>Outline</a:t>
+            </a:r>
+            <a:endParaRPr lang="en-US" dirty="0"/>
+          </a:p>
+        </p:txBody>
+      </p:sp>
+      <p:sp>
+        <p:nvSpPr>
+          <p:cNvPr id="9" name="Content Placeholder 8"/>
+          <p:cNvSpPr>
+            <a:spLocks noGrp="1"/>
+          </p:cNvSpPr>
+          <p:nvPr>
+            <p:ph idx="1"/>
+          </p:nvPr>
+        </p:nvSpPr>
+        <p:spPr/>
+        <p:txBody>
+          <a:bodyPr/>
+          <a:lstStyle/>
+          <a:p>
+            <a:r>
+              <a:rPr lang="en-US" dirty="0" smtClean="0"/>
+              <a:t>an overview of the project and its objectives,</a:t>
+            </a:r>
+          </a:p>
+          <a:p>
+            <a:r>
+              <a:rPr lang="en-US" dirty="0" smtClean="0"/>
+              <a:t>a </a:t>
+            </a:r>
+            <a:r>
+              <a:rPr lang="en-US" dirty="0"/>
+              <a:t>discussion of the architectural and timing </a:t>
+            </a:r>
+            <a:r>
+              <a:rPr lang="en-US" dirty="0" smtClean="0"/>
+              <a:t>design</a:t>
+            </a:r>
+          </a:p>
+          <a:p>
+            <a:pPr lvl="1"/>
+            <a:r>
+              <a:rPr lang="en-US" dirty="0" smtClean="0"/>
+              <a:t>New hardware architecture diagram</a:t>
+            </a:r>
+            <a:endParaRPr lang="en-US" dirty="0"/>
+          </a:p>
+          <a:p>
+            <a:r>
+              <a:rPr lang="en-US" dirty="0" smtClean="0"/>
+              <a:t>experiences </a:t>
+            </a:r>
+            <a:r>
+              <a:rPr lang="en-US" dirty="0"/>
+              <a:t>and issues in implementation (the difficult parts</a:t>
+            </a:r>
+            <a:r>
+              <a:rPr lang="en-US" dirty="0" smtClean="0"/>
+              <a:t>)</a:t>
+            </a:r>
+          </a:p>
+          <a:p>
+            <a:pPr lvl="1"/>
+            <a:r>
+              <a:rPr lang="en-US" dirty="0" smtClean="0"/>
+              <a:t>Fixed point accuracy and precision</a:t>
+            </a:r>
+          </a:p>
+          <a:p>
+            <a:pPr lvl="1"/>
+            <a:r>
+              <a:rPr lang="en-US" dirty="0" smtClean="0"/>
+              <a:t>FPGA resources</a:t>
+            </a:r>
+          </a:p>
+          <a:p>
+            <a:pPr lvl="1"/>
+            <a:r>
+              <a:rPr lang="en-US" dirty="0" smtClean="0"/>
+              <a:t>Driver data movement</a:t>
+            </a:r>
+            <a:endParaRPr lang="en-US" dirty="0"/>
+          </a:p>
+          <a:p>
+            <a:r>
+              <a:rPr lang="en-US" dirty="0" smtClean="0"/>
+              <a:t>a </a:t>
+            </a:r>
+            <a:r>
+              <a:rPr lang="en-US" dirty="0"/>
+              <a:t>summary including lessons </a:t>
+            </a:r>
+            <a:r>
+              <a:rPr lang="en-US" dirty="0" smtClean="0"/>
+              <a:t>learned</a:t>
+            </a:r>
+            <a:endParaRPr lang="en-US" dirty="0"/>
+          </a:p>
+        </p:txBody>
+      </p:sp>
+    </p:spTree>
+    <p:extLst>
+      <p:ext uri="{BB962C8B-B14F-4D97-AF65-F5344CB8AC3E}">
+        <p14:creationId xmlns:p14="http://schemas.microsoft.com/office/powerpoint/2010/main" val="1738559117"/>
+      </p:ext>
+    </p:extLst>
+  </p:cSld>
+  <p:clrMapOvr>
+    <a:masterClrMapping/>
+  </p:clrMapOvr>
+  <p:timing>
+    <p:tnLst>
+      <p:par>
+        <p:cTn xmlns:p14="http://schemas.microsoft.com/office/powerpoint/2010/main" id="1" dur="indefinite" restart="never" nodeType="tmRoot"/>
+      </p:par>
+    </p:tnLst>
+  </p:timing>
+</p:sld>
+</file>
+
+<file path=ppt/slides/slide2.xml><?xml version="1.0" encoding="utf-8"?>
+<p:sld xmlns:a="http://schemas.openxmlformats.org/drawingml/2006/main" xmlns:r="http://schemas.openxmlformats.org/officeDocument/2006/relationships" xmlns:p="http://schemas.openxmlformats.org/presentationml/2006/main">
+  <p:cSld>
+    <p:spTree>
+      <p:nvGrpSpPr>
+        <p:cNvPr id="1" name=""/>
+        <p:cNvGrpSpPr/>
+        <p:nvPr/>
+      </p:nvGrpSpPr>
+      <p:grpSpPr>
+        <a:xfrm>
+          <a:off x="0" y="0"/>
+          <a:ext cx="0" cy="0"/>
+          <a:chOff x="0" y="0"/>
+          <a:chExt cx="0" cy="0"/>
+        </a:xfrm>
+      </p:grpSpPr>
+      <p:sp>
+        <p:nvSpPr>
+          <p:cNvPr id="2" name="Title 1"/>
+          <p:cNvSpPr>
+            <a:spLocks noGrp="1"/>
+          </p:cNvSpPr>
+          <p:nvPr>
+            <p:ph type="title"/>
+          </p:nvPr>
+        </p:nvSpPr>
+        <p:spPr/>
+        <p:txBody>
+          <a:bodyPr/>
+          <a:lstStyle/>
+          <a:p>
+            <a:r>
               <a:rPr lang="en-US" sz="3600" dirty="0" smtClean="0"/>
               <a:t>A Core Robot Algorithm: Inverse Kinematics</a:t>
             </a:r>
@@ -4441,7 +4597,7 @@
 </p:sld>
 </file>
 
-<file path=ppt/slides/slide2.xml><?xml version="1.0" encoding="utf-8"?>
+<file path=ppt/slides/slide3.xml><?xml version="1.0" encoding="utf-8"?>
 <p:sld xmlns:a="http://schemas.openxmlformats.org/drawingml/2006/main" xmlns:r="http://schemas.openxmlformats.org/officeDocument/2006/relationships" xmlns:p="http://schemas.openxmlformats.org/presentationml/2006/main">
   <p:cSld>
     <p:spTree>
@@ -4563,13 +4719,8 @@
             </a:r>
             <a:r>
               <a:rPr lang="en-US" dirty="0" smtClean="0"/>
-              <a:t>s: compare against 10ms for general algorithm on </a:t>
-            </a:r>
-            <a:r>
-              <a:rPr lang="en-US" dirty="0" smtClean="0"/>
-              <a:t>CPU</a:t>
-            </a:r>
-            <a:endParaRPr lang="en-US" dirty="0" smtClean="0"/>
+              <a:t>s: compare against 10ms for general algorithm on CPU</a:t>
+            </a:r>
           </a:p>
         </p:txBody>
       </p:sp>

</xml_diff>

<commit_message>
Added a diagram to the presentation.
</commit_message>
<xml_diff>
--- a/doc/talk/IKSwift.pptx
+++ b/doc/talk/IKSwift.pptx
@@ -7,9 +7,10 @@
   <p:sldIdLst>
     <p:sldId id="257" r:id="rId2"/>
     <p:sldId id="258" r:id="rId3"/>
-    <p:sldId id="259" r:id="rId4"/>
-    <p:sldId id="263" r:id="rId5"/>
-    <p:sldId id="261" r:id="rId6"/>
+    <p:sldId id="264" r:id="rId4"/>
+    <p:sldId id="259" r:id="rId5"/>
+    <p:sldId id="263" r:id="rId6"/>
+    <p:sldId id="261" r:id="rId7"/>
   </p:sldIdLst>
   <p:sldSz cx="9144000" cy="6858000" type="screen4x3"/>
   <p:notesSz cx="7772400" cy="10058400"/>
@@ -2485,6 +2486,103 @@
       </p:grpSpPr>
       <p:sp>
         <p:nvSpPr>
+          <p:cNvPr id="4" name="Title 3"/>
+          <p:cNvSpPr>
+            <a:spLocks noGrp="1"/>
+          </p:cNvSpPr>
+          <p:nvPr>
+            <p:ph type="title"/>
+          </p:nvPr>
+        </p:nvSpPr>
+        <p:spPr/>
+        <p:txBody>
+          <a:bodyPr/>
+          <a:lstStyle/>
+          <a:p>
+            <a:pPr algn="ctr"/>
+            <a:r>
+              <a:rPr lang="en-US" sz="3200" b="1" dirty="0" smtClean="0">
+                <a:latin typeface="Franklin Gothic Medium"/>
+                <a:cs typeface="Franklin Gothic Medium"/>
+              </a:rPr>
+              <a:t>Architecture and </a:t>
+            </a:r>
+            <a:r>
+              <a:rPr lang="en-US" sz="3200" b="1" dirty="0" err="1" smtClean="0">
+                <a:latin typeface="Franklin Gothic Medium"/>
+                <a:cs typeface="Franklin Gothic Medium"/>
+              </a:rPr>
+              <a:t>Toolchain</a:t>
+            </a:r>
+            <a:endParaRPr lang="en-US" sz="3200" b="1" dirty="0">
+              <a:latin typeface="Franklin Gothic Medium"/>
+              <a:cs typeface="Franklin Gothic Medium"/>
+            </a:endParaRPr>
+          </a:p>
+        </p:txBody>
+      </p:sp>
+      <p:pic>
+        <p:nvPicPr>
+          <p:cNvPr id="6" name="Picture 5" descr="toolchain.eps"/>
+          <p:cNvPicPr>
+            <a:picLocks noChangeAspect="1"/>
+          </p:cNvPicPr>
+          <p:nvPr/>
+        </p:nvPicPr>
+        <p:blipFill>
+          <a:blip r:embed="rId2">
+            <a:extLst>
+              <a:ext uri="{28A0092B-C50C-407E-A947-70E740481C1C}">
+                <a14:useLocalDpi xmlns:a14="http://schemas.microsoft.com/office/drawing/2010/main" val="0"/>
+              </a:ext>
+            </a:extLst>
+          </a:blip>
+          <a:stretch>
+            <a:fillRect/>
+          </a:stretch>
+        </p:blipFill>
+        <p:spPr>
+          <a:xfrm>
+            <a:off x="0" y="1128944"/>
+            <a:ext cx="9144000" cy="5119456"/>
+          </a:xfrm>
+          <a:prstGeom prst="rect">
+            <a:avLst/>
+          </a:prstGeom>
+        </p:spPr>
+      </p:pic>
+    </p:spTree>
+    <p:extLst>
+      <p:ext uri="{BB962C8B-B14F-4D97-AF65-F5344CB8AC3E}">
+        <p14:creationId xmlns:p14="http://schemas.microsoft.com/office/powerpoint/2010/main" val="4177583015"/>
+      </p:ext>
+    </p:extLst>
+  </p:cSld>
+  <p:clrMapOvr>
+    <a:masterClrMapping/>
+  </p:clrMapOvr>
+</p:sld>
+</file>
+
+<file path=ppt/slides/slide4.xml><?xml version="1.0" encoding="utf-8"?>
+<p:sld xmlns:a="http://schemas.openxmlformats.org/drawingml/2006/main" xmlns:r="http://schemas.openxmlformats.org/officeDocument/2006/relationships" xmlns:p="http://schemas.openxmlformats.org/presentationml/2006/main">
+  <p:cSld>
+    <p:spTree>
+      <p:nvGrpSpPr>
+        <p:cNvPr id="1" name=""/>
+        <p:cNvGrpSpPr/>
+        <p:nvPr/>
+      </p:nvGrpSpPr>
+      <p:grpSpPr>
+        <a:xfrm>
+          <a:off x="0" y="0"/>
+          <a:ext cx="0" cy="0"/>
+          <a:chOff x="0" y="0"/>
+          <a:chExt cx="0" cy="0"/>
+        </a:xfrm>
+      </p:grpSpPr>
+      <p:sp>
+        <p:nvSpPr>
           <p:cNvPr id="49" name="TextShape 1"/>
           <p:cNvSpPr txBox="1"/>
           <p:nvPr/>
@@ -2523,8 +2621,8 @@
         </p:nvSpPr>
         <p:spPr>
           <a:xfrm>
-            <a:off x="457200" y="1295400"/>
-            <a:ext cx="8382000" cy="3970318"/>
+            <a:off x="0" y="1295400"/>
+            <a:ext cx="9144000" cy="3970318"/>
           </a:xfrm>
           <a:prstGeom prst="rect">
             <a:avLst/>
@@ -2587,8 +2685,23 @@
               <a:rPr lang="en-US" sz="2800" dirty="0" smtClean="0">
                 <a:latin typeface="Franklin Gothic Medium" pitchFamily="34" charset="0"/>
               </a:rPr>
-              <a:t>ixed point representations throughout system</a:t>
-            </a:r>
+              <a:t>ixed point representations throughout </a:t>
+            </a:r>
+            <a:r>
+              <a:rPr lang="en-US" sz="2800" dirty="0" smtClean="0">
+                <a:latin typeface="Franklin Gothic Medium" pitchFamily="34" charset="0"/>
+              </a:rPr>
+              <a:t>system</a:t>
+            </a:r>
+          </a:p>
+          <a:p>
+            <a:pPr lvl="1">
+              <a:buFont typeface="Arial" pitchFamily="34" charset="0"/>
+              <a:buChar char="•"/>
+            </a:pPr>
+            <a:endParaRPr lang="en-US" sz="2800" dirty="0" smtClean="0">
+              <a:latin typeface="Franklin Gothic Medium" pitchFamily="34" charset="0"/>
+            </a:endParaRPr>
           </a:p>
           <a:p>
             <a:pPr>
@@ -2639,7 +2752,7 @@
   <p:timing>
     <p:tnLst>
       <p:par>
-        <p:cTn id="1" dur="indefinite" restart="never" nodeType="tmRoot">
+        <p:cTn xmlns:p14="http://schemas.microsoft.com/office/powerpoint/2010/main" id="1" dur="indefinite" restart="never" nodeType="tmRoot">
           <p:childTnLst>
             <p:seq>
               <p:cTn id="2" nodeType="mainSeq"/>
@@ -2666,158 +2779,6 @@
 </p:sld>
 </file>
 
-<file path=ppt/slides/slide4.xml><?xml version="1.0" encoding="utf-8"?>
-<p:sld xmlns:a="http://schemas.openxmlformats.org/drawingml/2006/main" xmlns:r="http://schemas.openxmlformats.org/officeDocument/2006/relationships" xmlns:p="http://schemas.openxmlformats.org/presentationml/2006/main">
-  <p:cSld>
-    <p:spTree>
-      <p:nvGrpSpPr>
-        <p:cNvPr id="1" name=""/>
-        <p:cNvGrpSpPr/>
-        <p:nvPr/>
-      </p:nvGrpSpPr>
-      <p:grpSpPr>
-        <a:xfrm>
-          <a:off x="0" y="0"/>
-          <a:ext cx="0" cy="0"/>
-          <a:chOff x="0" y="0"/>
-          <a:chExt cx="0" cy="0"/>
-        </a:xfrm>
-      </p:grpSpPr>
-      <p:sp>
-        <p:nvSpPr>
-          <p:cNvPr id="2" name="Title 1"/>
-          <p:cNvSpPr>
-            <a:spLocks noGrp="1"/>
-          </p:cNvSpPr>
-          <p:nvPr>
-            <p:ph type="title"/>
-          </p:nvPr>
-        </p:nvSpPr>
-        <p:spPr/>
-        <p:txBody>
-          <a:bodyPr/>
-          <a:lstStyle/>
-          <a:p>
-            <a:pPr algn="ctr"/>
-            <a:r>
-              <a:rPr lang="en-US" sz="3600" b="1" dirty="0" smtClean="0">
-                <a:latin typeface="Franklin Gothic Medium" pitchFamily="34" charset="0"/>
-              </a:rPr>
-              <a:t>Experiences and Issues</a:t>
-            </a:r>
-            <a:endParaRPr lang="en-US" sz="3600" b="1" dirty="0">
-              <a:latin typeface="Franklin Gothic Medium" pitchFamily="34" charset="0"/>
-            </a:endParaRPr>
-          </a:p>
-        </p:txBody>
-      </p:sp>
-      <p:sp>
-        <p:nvSpPr>
-          <p:cNvPr id="3" name="Text Placeholder 2"/>
-          <p:cNvSpPr>
-            <a:spLocks noGrp="1"/>
-          </p:cNvSpPr>
-          <p:nvPr>
-            <p:ph type="body"/>
-          </p:nvPr>
-        </p:nvSpPr>
-        <p:spPr>
-          <a:xfrm>
-            <a:off x="609600" y="1524000"/>
-            <a:ext cx="9143640" cy="6019560"/>
-          </a:xfrm>
-        </p:spPr>
-        <p:txBody>
-          <a:bodyPr/>
-          <a:lstStyle/>
-          <a:p>
-            <a:pPr algn="l">
-              <a:buFont typeface="Arial" pitchFamily="34" charset="0"/>
-              <a:buChar char="•"/>
-            </a:pPr>
-            <a:r>
-              <a:rPr lang="en-US" sz="2800" dirty="0" smtClean="0">
-                <a:latin typeface="Franklin Gothic Medium" pitchFamily="34" charset="0"/>
-              </a:rPr>
-              <a:t>Deciding on the algorithm to use</a:t>
-            </a:r>
-          </a:p>
-          <a:p>
-            <a:pPr algn="l">
-              <a:buFont typeface="Arial" pitchFamily="34" charset="0"/>
-              <a:buChar char="•"/>
-            </a:pPr>
-            <a:r>
-              <a:rPr lang="en-US" sz="2800" dirty="0" smtClean="0">
-                <a:latin typeface="Franklin Gothic Medium" pitchFamily="34" charset="0"/>
-              </a:rPr>
-              <a:t>Determining what implementation would fit on </a:t>
-            </a:r>
-          </a:p>
-          <a:p>
-            <a:pPr algn="l"/>
-            <a:r>
-              <a:rPr lang="en-US" sz="2800" dirty="0">
-                <a:latin typeface="Franklin Gothic Medium" pitchFamily="34" charset="0"/>
-              </a:rPr>
-              <a:t>  </a:t>
-            </a:r>
-            <a:r>
-              <a:rPr lang="en-US" sz="2800" dirty="0" smtClean="0">
-                <a:latin typeface="Franklin Gothic Medium" pitchFamily="34" charset="0"/>
-              </a:rPr>
-              <a:t>the board</a:t>
-            </a:r>
-          </a:p>
-          <a:p>
-            <a:pPr algn="l">
-              <a:buFont typeface="Arial" pitchFamily="34" charset="0"/>
-              <a:buChar char="•"/>
-            </a:pPr>
-            <a:r>
-              <a:rPr lang="en-US" sz="2800" dirty="0" smtClean="0">
-                <a:latin typeface="Franklin Gothic Medium" pitchFamily="34" charset="0"/>
-              </a:rPr>
-              <a:t>Convincing ourselves the algorithm works</a:t>
-            </a:r>
-          </a:p>
-          <a:p>
-            <a:pPr algn="l">
-              <a:buFont typeface="Arial" pitchFamily="34" charset="0"/>
-              <a:buChar char="•"/>
-            </a:pPr>
-            <a:r>
-              <a:rPr lang="en-US" sz="2800" dirty="0" smtClean="0">
-                <a:latin typeface="Franklin Gothic Medium" pitchFamily="34" charset="0"/>
-              </a:rPr>
-              <a:t>Extensively tested the core hardware, but not the</a:t>
-            </a:r>
-          </a:p>
-          <a:p>
-            <a:pPr algn="l"/>
-            <a:r>
-              <a:rPr lang="en-US" sz="2800" dirty="0" smtClean="0">
-                <a:latin typeface="Franklin Gothic Medium" pitchFamily="34" charset="0"/>
-              </a:rPr>
-              <a:t>  top-level interface (until yesterday)</a:t>
-            </a:r>
-          </a:p>
-          <a:p>
-            <a:pPr algn="l"/>
-            <a:endParaRPr lang="en-US" sz="2800" dirty="0" smtClean="0">
-              <a:latin typeface="Franklin Gothic Medium" pitchFamily="34" charset="0"/>
-            </a:endParaRPr>
-          </a:p>
-        </p:txBody>
-      </p:sp>
-    </p:spTree>
-  </p:cSld>
-  <p:clrMapOvr>
-    <a:masterClrMapping/>
-  </p:clrMapOvr>
-</p:sld>
-</file>
-
 <file path=ppt/slides/slide5.xml><?xml version="1.0" encoding="utf-8"?>
 <p:sld xmlns:a="http://schemas.openxmlformats.org/drawingml/2006/main" xmlns:r="http://schemas.openxmlformats.org/officeDocument/2006/relationships" xmlns:p="http://schemas.openxmlformats.org/presentationml/2006/main">
   <p:cSld>
@@ -2837,6 +2798,158 @@
       </p:grpSpPr>
       <p:sp>
         <p:nvSpPr>
+          <p:cNvPr id="2" name="Title 1"/>
+          <p:cNvSpPr>
+            <a:spLocks noGrp="1"/>
+          </p:cNvSpPr>
+          <p:nvPr>
+            <p:ph type="title"/>
+          </p:nvPr>
+        </p:nvSpPr>
+        <p:spPr/>
+        <p:txBody>
+          <a:bodyPr/>
+          <a:lstStyle/>
+          <a:p>
+            <a:pPr algn="ctr"/>
+            <a:r>
+              <a:rPr lang="en-US" sz="3600" b="1" dirty="0" smtClean="0">
+                <a:latin typeface="Franklin Gothic Medium" pitchFamily="34" charset="0"/>
+              </a:rPr>
+              <a:t>Experiences and Issues</a:t>
+            </a:r>
+            <a:endParaRPr lang="en-US" sz="3600" b="1" dirty="0">
+              <a:latin typeface="Franklin Gothic Medium" pitchFamily="34" charset="0"/>
+            </a:endParaRPr>
+          </a:p>
+        </p:txBody>
+      </p:sp>
+      <p:sp>
+        <p:nvSpPr>
+          <p:cNvPr id="3" name="Text Placeholder 2"/>
+          <p:cNvSpPr>
+            <a:spLocks noGrp="1"/>
+          </p:cNvSpPr>
+          <p:nvPr>
+            <p:ph type="body"/>
+          </p:nvPr>
+        </p:nvSpPr>
+        <p:spPr>
+          <a:xfrm>
+            <a:off x="609600" y="1524000"/>
+            <a:ext cx="9143640" cy="6019560"/>
+          </a:xfrm>
+        </p:spPr>
+        <p:txBody>
+          <a:bodyPr/>
+          <a:lstStyle/>
+          <a:p>
+            <a:pPr algn="l">
+              <a:buFont typeface="Arial" pitchFamily="34" charset="0"/>
+              <a:buChar char="•"/>
+            </a:pPr>
+            <a:r>
+              <a:rPr lang="en-US" sz="2800" dirty="0" smtClean="0">
+                <a:latin typeface="Franklin Gothic Medium" pitchFamily="34" charset="0"/>
+              </a:rPr>
+              <a:t>Deciding on the algorithm to use</a:t>
+            </a:r>
+          </a:p>
+          <a:p>
+            <a:pPr algn="l">
+              <a:buFont typeface="Arial" pitchFamily="34" charset="0"/>
+              <a:buChar char="•"/>
+            </a:pPr>
+            <a:r>
+              <a:rPr lang="en-US" sz="2800" dirty="0" smtClean="0">
+                <a:latin typeface="Franklin Gothic Medium" pitchFamily="34" charset="0"/>
+              </a:rPr>
+              <a:t>Determining what implementation would fit on </a:t>
+            </a:r>
+          </a:p>
+          <a:p>
+            <a:pPr algn="l"/>
+            <a:r>
+              <a:rPr lang="en-US" sz="2800" dirty="0">
+                <a:latin typeface="Franklin Gothic Medium" pitchFamily="34" charset="0"/>
+              </a:rPr>
+              <a:t>  </a:t>
+            </a:r>
+            <a:r>
+              <a:rPr lang="en-US" sz="2800" dirty="0" smtClean="0">
+                <a:latin typeface="Franklin Gothic Medium" pitchFamily="34" charset="0"/>
+              </a:rPr>
+              <a:t>the board</a:t>
+            </a:r>
+          </a:p>
+          <a:p>
+            <a:pPr algn="l">
+              <a:buFont typeface="Arial" pitchFamily="34" charset="0"/>
+              <a:buChar char="•"/>
+            </a:pPr>
+            <a:r>
+              <a:rPr lang="en-US" sz="2800" dirty="0" smtClean="0">
+                <a:latin typeface="Franklin Gothic Medium" pitchFamily="34" charset="0"/>
+              </a:rPr>
+              <a:t>Convincing ourselves the algorithm works</a:t>
+            </a:r>
+          </a:p>
+          <a:p>
+            <a:pPr algn="l">
+              <a:buFont typeface="Arial" pitchFamily="34" charset="0"/>
+              <a:buChar char="•"/>
+            </a:pPr>
+            <a:r>
+              <a:rPr lang="en-US" sz="2800" dirty="0" smtClean="0">
+                <a:latin typeface="Franklin Gothic Medium" pitchFamily="34" charset="0"/>
+              </a:rPr>
+              <a:t>Extensively tested the core hardware, but not the</a:t>
+            </a:r>
+          </a:p>
+          <a:p>
+            <a:pPr algn="l"/>
+            <a:r>
+              <a:rPr lang="en-US" sz="2800" dirty="0" smtClean="0">
+                <a:latin typeface="Franklin Gothic Medium" pitchFamily="34" charset="0"/>
+              </a:rPr>
+              <a:t>  top-level interface (until yesterday)</a:t>
+            </a:r>
+          </a:p>
+          <a:p>
+            <a:pPr algn="l"/>
+            <a:endParaRPr lang="en-US" sz="2800" dirty="0" smtClean="0">
+              <a:latin typeface="Franklin Gothic Medium" pitchFamily="34" charset="0"/>
+            </a:endParaRPr>
+          </a:p>
+        </p:txBody>
+      </p:sp>
+    </p:spTree>
+  </p:cSld>
+  <p:clrMapOvr>
+    <a:masterClrMapping/>
+  </p:clrMapOvr>
+</p:sld>
+</file>
+
+<file path=ppt/slides/slide6.xml><?xml version="1.0" encoding="utf-8"?>
+<p:sld xmlns:a="http://schemas.openxmlformats.org/drawingml/2006/main" xmlns:r="http://schemas.openxmlformats.org/officeDocument/2006/relationships" xmlns:p="http://schemas.openxmlformats.org/presentationml/2006/main">
+  <p:cSld>
+    <p:spTree>
+      <p:nvGrpSpPr>
+        <p:cNvPr id="1" name=""/>
+        <p:cNvGrpSpPr/>
+        <p:nvPr/>
+      </p:nvGrpSpPr>
+      <p:grpSpPr>
+        <a:xfrm>
+          <a:off x="0" y="0"/>
+          <a:ext cx="0" cy="0"/>
+          <a:chOff x="0" y="0"/>
+          <a:chExt cx="0" cy="0"/>
+        </a:xfrm>
+      </p:grpSpPr>
+      <p:sp>
+        <p:nvSpPr>
           <p:cNvPr id="53" name="TextShape 1"/>
           <p:cNvSpPr txBox="1"/>
           <p:nvPr/>
@@ -2935,9 +3048,6 @@
               </a:rPr>
               <a:t>Leave no ambiguity in the design</a:t>
             </a:r>
-            <a:endParaRPr lang="en-US" sz="2800" dirty="0" smtClean="0">
-              <a:latin typeface="Franklin Gothic Medium" pitchFamily="34" charset="0"/>
-            </a:endParaRPr>
           </a:p>
           <a:p>
             <a:pPr>
@@ -2967,7 +3077,7 @@
   <p:timing>
     <p:tnLst>
       <p:par>
-        <p:cTn id="1" dur="indefinite" restart="never" nodeType="tmRoot">
+        <p:cTn xmlns:p14="http://schemas.microsoft.com/office/powerpoint/2010/main" id="1" dur="indefinite" restart="never" nodeType="tmRoot">
           <p:childTnLst>
             <p:seq>
               <p:cTn id="2" nodeType="mainSeq"/>

</xml_diff>

<commit_message>
Adding a PDF version of talk.
</commit_message>
<xml_diff>
--- a/doc/talk/IKSwift.pptx
+++ b/doc/talk/IKSwift.pptx
@@ -2685,13 +2685,7 @@
               <a:rPr lang="en-US" sz="2800" dirty="0" smtClean="0">
                 <a:latin typeface="Franklin Gothic Medium" pitchFamily="34" charset="0"/>
               </a:rPr>
-              <a:t>ixed point representations throughout </a:t>
-            </a:r>
-            <a:r>
-              <a:rPr lang="en-US" sz="2800" dirty="0" smtClean="0">
-                <a:latin typeface="Franklin Gothic Medium" pitchFamily="34" charset="0"/>
-              </a:rPr>
-              <a:t>system</a:t>
+              <a:t>ixed point representations throughout system</a:t>
             </a:r>
           </a:p>
           <a:p>
@@ -2836,8 +2830,8 @@
         </p:nvSpPr>
         <p:spPr>
           <a:xfrm>
-            <a:off x="609600" y="1524000"/>
-            <a:ext cx="9143640" cy="6019560"/>
+            <a:off x="228600" y="533400"/>
+            <a:ext cx="9143640" cy="5790960"/>
           </a:xfrm>
         </p:spPr>
         <p:txBody>

</xml_diff>